<commit_message>
Update submission 2 slides
</commit_message>
<xml_diff>
--- a/Submission2/Topic-2.pptx
+++ b/Submission2/Topic-2.pptx
@@ -5809,8 +5809,8 @@
           </a:p>
         </p:txBody>
       </p:sp>
-      <mc:AlternateContent xmlns:mc="http://schemas.openxmlformats.org/markup-compatibility/2006">
-        <mc:Choice xmlns:a14="http://schemas.microsoft.com/office/drawing/2010/main" Requires="a14">
+      <mc:AlternateContent xmlns:mc="http://schemas.openxmlformats.org/markup-compatibility/2006" xmlns:a14="http://schemas.microsoft.com/office/drawing/2010/main">
+        <mc:Choice Requires="a14">
           <p:sp>
             <p:nvSpPr>
               <p:cNvPr id="6" name="Inhaltsplatzhalter 5">
@@ -6167,7 +6167,7 @@
             </p:txBody>
           </p:sp>
         </mc:Choice>
-        <mc:Fallback>
+        <mc:Fallback xmlns="">
           <p:sp>
             <p:nvSpPr>
               <p:cNvPr id="6" name="Inhaltsplatzhalter 5">
@@ -7202,7 +7202,27 @@
                         <a:latin typeface="Cambria Math" panose="02040503050406030204" pitchFamily="18" charset="0"/>
                         <a:cs typeface="Segoe UI"/>
                       </a:rPr>
-                      <m:t>∗0.005,0)</m:t>
+                      <m:t>∗0.05,</m:t>
+                    </m:r>
+                    <m:r>
+                      <a:rPr lang="de-DE" sz="2800" b="0" i="1" smtClean="0">
+                        <a:solidFill>
+                          <a:srgbClr val="000000"/>
+                        </a:solidFill>
+                        <a:latin typeface="Cambria Math" panose="02040503050406030204" pitchFamily="18" charset="0"/>
+                        <a:cs typeface="Segoe UI"/>
+                      </a:rPr>
+                      <m:t> </m:t>
+                    </m:r>
+                    <m:r>
+                      <a:rPr lang="de-DE" sz="2800" b="0" i="1" smtClean="0">
+                        <a:solidFill>
+                          <a:srgbClr val="000000"/>
+                        </a:solidFill>
+                        <a:latin typeface="Cambria Math" panose="02040503050406030204" pitchFamily="18" charset="0"/>
+                        <a:cs typeface="Segoe UI"/>
+                      </a:rPr>
+                      <m:t>0)</m:t>
                     </m:r>
                   </m:oMath>
                 </a14:m>
@@ -7405,8 +7425,8 @@
           </a:p>
         </p:txBody>
       </p:sp>
-      <mc:AlternateContent xmlns:mc="http://schemas.openxmlformats.org/markup-compatibility/2006">
-        <mc:Choice xmlns:a14="http://schemas.microsoft.com/office/drawing/2010/main" Requires="a14">
+      <mc:AlternateContent xmlns:mc="http://schemas.openxmlformats.org/markup-compatibility/2006" xmlns:a14="http://schemas.microsoft.com/office/drawing/2010/main">
+        <mc:Choice Requires="a14">
           <p:sp>
             <p:nvSpPr>
               <p:cNvPr id="6" name="Inhaltsplatzhalter 5">
@@ -7532,7 +7552,7 @@
             </p:txBody>
           </p:sp>
         </mc:Choice>
-        <mc:Fallback>
+        <mc:Fallback xmlns="">
           <p:sp>
             <p:nvSpPr>
               <p:cNvPr id="6" name="Inhaltsplatzhalter 5">
@@ -10865,7 +10885,7 @@
 </file>
 
 <file path=ppt/slides/slide7.xml><?xml version="1.0" encoding="utf-8"?>
-<p:sld xmlns:a="http://schemas.openxmlformats.org/drawingml/2006/main" xmlns:r="http://schemas.openxmlformats.org/officeDocument/2006/relationships" xmlns:p="http://schemas.openxmlformats.org/presentationml/2006/main" show="0">
+<p:sld xmlns:a="http://schemas.openxmlformats.org/drawingml/2006/main" xmlns:r="http://schemas.openxmlformats.org/officeDocument/2006/relationships" xmlns:p="http://schemas.openxmlformats.org/presentationml/2006/main">
   <p:cSld>
     <p:spTree>
       <p:nvGrpSpPr>
@@ -12222,6 +12242,76 @@
 </file>
 
 <file path=customXml/item1.xml><?xml version="1.0" encoding="utf-8"?>
+<?mso-contentType ?>
+<FormTemplates xmlns="http://schemas.microsoft.com/sharepoint/v3/contenttype/forms">
+  <Display>DocumentLibraryForm</Display>
+  <Edit>DocumentLibraryForm</Edit>
+  <New>DocumentLibraryForm</New>
+</FormTemplates>
+</file>
+
+<file path=customXml/item2.xml><?xml version="1.0" encoding="utf-8"?>
+<p:properties xmlns:p="http://schemas.microsoft.com/office/2006/metadata/properties" xmlns:xsi="http://www.w3.org/2001/XMLSchema-instance" xmlns:pc="http://schemas.microsoft.com/office/infopath/2007/PartnerControls">
+  <documentManagement>
+    <TrackTaxHTField0 xmlns="2295e2e7-0eeb-498e-8716-217bb2ee6ee3">
+      <Terms xmlns="http://schemas.microsoft.com/office/infopath/2007/PartnerControls"/>
+    </TrackTaxHTField0>
+    <CampaignTaxHTField0 xmlns="2295e2e7-0eeb-498e-8716-217bb2ee6ee3">
+      <Terms xmlns="http://schemas.microsoft.com/office/infopath/2007/PartnerControls"/>
+    </CampaignTaxHTField0>
+    <Event_x0020_End_x0020_Date xmlns="2295e2e7-0eeb-498e-8716-217bb2ee6ee3">2013-06-28T07:00:00+00:00</Event_x0020_End_x0020_Date>
+    <Event_x0020_Start_x0020_Date xmlns="2295e2e7-0eeb-498e-8716-217bb2ee6ee3">2013-06-26T07:00:00+00:00</Event_x0020_Start_x0020_Date>
+    <MS_x0020_Speaker xmlns="2295e2e7-0eeb-498e-8716-217bb2ee6ee3">
+      <UserInfo>
+        <DisplayName/>
+        <AccountId xsi:nil="true"/>
+        <AccountType/>
+      </UserInfo>
+    </MS_x0020_Speaker>
+    <External_x0020_Speaker xmlns="2295e2e7-0eeb-498e-8716-217bb2ee6ee3" xsi:nil="true"/>
+    <Session_x0020_Code xmlns="2295e2e7-0eeb-498e-8716-217bb2ee6ee3" xsi:nil="true"/>
+    <ProductTaxHTField0 xmlns="2295e2e7-0eeb-498e-8716-217bb2ee6ee3">
+      <Terms xmlns="http://schemas.microsoft.com/office/infopath/2007/PartnerControls"/>
+    </ProductTaxHTField0>
+    <Presentation_x0020_Date xmlns="2295e2e7-0eeb-498e-8716-217bb2ee6ee3">2013-06-26T00:00:00-07:00</Presentation_x0020_Date>
+    <Event_x0020_LocationTaxHTField0 xmlns="2295e2e7-0eeb-498e-8716-217bb2ee6ee3">
+      <Terms xmlns="http://schemas.microsoft.com/office/infopath/2007/PartnerControls">
+        <TermInfo xmlns="http://schemas.microsoft.com/office/infopath/2007/PartnerControls">
+          <TermName xmlns="http://schemas.microsoft.com/office/infopath/2007/PartnerControls">San Francisco</TermName>
+          <TermId xmlns="http://schemas.microsoft.com/office/infopath/2007/PartnerControls">84dfcb53-432b-499d-8965-93d483d36b4a</TermId>
+        </TermInfo>
+      </Terms>
+    </Event_x0020_LocationTaxHTField0>
+    <Event1TaxHTField0 xmlns="2295e2e7-0eeb-498e-8716-217bb2ee6ee3">
+      <Terms xmlns="http://schemas.microsoft.com/office/infopath/2007/PartnerControls">
+        <TermInfo xmlns="http://schemas.microsoft.com/office/infopath/2007/PartnerControls">
+          <TermName xmlns="http://schemas.microsoft.com/office/infopath/2007/PartnerControls">BUILD</TermName>
+          <TermId xmlns="http://schemas.microsoft.com/office/infopath/2007/PartnerControls">58542b36-5bf5-46a6-a53f-a41fb7a73785</TermId>
+        </TermInfo>
+      </Terms>
+    </Event1TaxHTField0>
+    <MS_x0020_Content_x0020_Owner xmlns="2295e2e7-0eeb-498e-8716-217bb2ee6ee3">
+      <UserInfo>
+        <DisplayName/>
+        <AccountId xsi:nil="true"/>
+        <AccountType/>
+      </UserInfo>
+    </MS_x0020_Content_x0020_Owner>
+    <Event_x0020_VenueTaxHTField0 xmlns="2295e2e7-0eeb-498e-8716-217bb2ee6ee3">
+      <Terms xmlns="http://schemas.microsoft.com/office/infopath/2007/PartnerControls"/>
+    </Event_x0020_VenueTaxHTField0>
+    <TaxCatchAll xmlns="230e9df3-be65-4c73-a93b-d1236ebd677e">
+      <Value>497</Value>
+      <Value>605</Value>
+    </TaxCatchAll>
+    <AudienceTaxHTField0 xmlns="8b529f77-48ab-4581-b468-93f09345b8aa">
+      <Terms xmlns="http://schemas.microsoft.com/office/infopath/2007/PartnerControls"/>
+    </AudienceTaxHTField0>
+  </documentManagement>
+</p:properties>
+</file>
+
+<file path=customXml/item3.xml><?xml version="1.0" encoding="utf-8"?>
 <ct:contentTypeSchema xmlns:ct="http://schemas.microsoft.com/office/2006/metadata/contentType" xmlns:ma="http://schemas.microsoft.com/office/2006/metadata/properties/metaAttributes" ct:_="" ma:_="" ma:contentTypeName="PresentationsDoc" ma:contentTypeID="0x010100B88FC3ECA26D1C46B3C4C83281D2EB9C003BBE479AF4108146A616B6B5E7069DBC" ma:contentTypeVersion="61" ma:contentTypeDescription="" ma:contentTypeScope="" ma:versionID="89fe5faf2f25a24617a4f509b32cc989">
   <xsd:schema xmlns:xsd="http://www.w3.org/2001/XMLSchema" xmlns:xs="http://www.w3.org/2001/XMLSchema" xmlns:p="http://schemas.microsoft.com/office/2006/metadata/properties" xmlns:ns2="2295e2e7-0eeb-498e-8716-217bb2ee6ee3" xmlns:ns3="230e9df3-be65-4c73-a93b-d1236ebd677e" xmlns:ns4="8b529f77-48ab-4581-b468-93f09345b8aa" targetNamespace="http://schemas.microsoft.com/office/2006/metadata/properties" ma:root="true" ma:fieldsID="dfcb5511298a0ed35e170e5fd997f4f9" ns2:_="" ns3:_="" ns4:_="">
     <xsd:import namespace="2295e2e7-0eeb-498e-8716-217bb2ee6ee3"/>
@@ -12505,92 +12595,10 @@
 </ct:contentTypeSchema>
 </file>
 
-<file path=customXml/item2.xml><?xml version="1.0" encoding="utf-8"?>
-<p:properties xmlns:p="http://schemas.microsoft.com/office/2006/metadata/properties" xmlns:xsi="http://www.w3.org/2001/XMLSchema-instance" xmlns:pc="http://schemas.microsoft.com/office/infopath/2007/PartnerControls">
-  <documentManagement>
-    <TrackTaxHTField0 xmlns="2295e2e7-0eeb-498e-8716-217bb2ee6ee3">
-      <Terms xmlns="http://schemas.microsoft.com/office/infopath/2007/PartnerControls"/>
-    </TrackTaxHTField0>
-    <CampaignTaxHTField0 xmlns="2295e2e7-0eeb-498e-8716-217bb2ee6ee3">
-      <Terms xmlns="http://schemas.microsoft.com/office/infopath/2007/PartnerControls"/>
-    </CampaignTaxHTField0>
-    <Event_x0020_End_x0020_Date xmlns="2295e2e7-0eeb-498e-8716-217bb2ee6ee3">2013-06-28T07:00:00+00:00</Event_x0020_End_x0020_Date>
-    <Event_x0020_Start_x0020_Date xmlns="2295e2e7-0eeb-498e-8716-217bb2ee6ee3">2013-06-26T07:00:00+00:00</Event_x0020_Start_x0020_Date>
-    <MS_x0020_Speaker xmlns="2295e2e7-0eeb-498e-8716-217bb2ee6ee3">
-      <UserInfo>
-        <DisplayName/>
-        <AccountId xsi:nil="true"/>
-        <AccountType/>
-      </UserInfo>
-    </MS_x0020_Speaker>
-    <External_x0020_Speaker xmlns="2295e2e7-0eeb-498e-8716-217bb2ee6ee3" xsi:nil="true"/>
-    <Session_x0020_Code xmlns="2295e2e7-0eeb-498e-8716-217bb2ee6ee3" xsi:nil="true"/>
-    <ProductTaxHTField0 xmlns="2295e2e7-0eeb-498e-8716-217bb2ee6ee3">
-      <Terms xmlns="http://schemas.microsoft.com/office/infopath/2007/PartnerControls"/>
-    </ProductTaxHTField0>
-    <Presentation_x0020_Date xmlns="2295e2e7-0eeb-498e-8716-217bb2ee6ee3">2013-06-26T00:00:00-07:00</Presentation_x0020_Date>
-    <Event_x0020_LocationTaxHTField0 xmlns="2295e2e7-0eeb-498e-8716-217bb2ee6ee3">
-      <Terms xmlns="http://schemas.microsoft.com/office/infopath/2007/PartnerControls">
-        <TermInfo xmlns="http://schemas.microsoft.com/office/infopath/2007/PartnerControls">
-          <TermName xmlns="http://schemas.microsoft.com/office/infopath/2007/PartnerControls">San Francisco</TermName>
-          <TermId xmlns="http://schemas.microsoft.com/office/infopath/2007/PartnerControls">84dfcb53-432b-499d-8965-93d483d36b4a</TermId>
-        </TermInfo>
-      </Terms>
-    </Event_x0020_LocationTaxHTField0>
-    <Event1TaxHTField0 xmlns="2295e2e7-0eeb-498e-8716-217bb2ee6ee3">
-      <Terms xmlns="http://schemas.microsoft.com/office/infopath/2007/PartnerControls">
-        <TermInfo xmlns="http://schemas.microsoft.com/office/infopath/2007/PartnerControls">
-          <TermName xmlns="http://schemas.microsoft.com/office/infopath/2007/PartnerControls">BUILD</TermName>
-          <TermId xmlns="http://schemas.microsoft.com/office/infopath/2007/PartnerControls">58542b36-5bf5-46a6-a53f-a41fb7a73785</TermId>
-        </TermInfo>
-      </Terms>
-    </Event1TaxHTField0>
-    <MS_x0020_Content_x0020_Owner xmlns="2295e2e7-0eeb-498e-8716-217bb2ee6ee3">
-      <UserInfo>
-        <DisplayName/>
-        <AccountId xsi:nil="true"/>
-        <AccountType/>
-      </UserInfo>
-    </MS_x0020_Content_x0020_Owner>
-    <Event_x0020_VenueTaxHTField0 xmlns="2295e2e7-0eeb-498e-8716-217bb2ee6ee3">
-      <Terms xmlns="http://schemas.microsoft.com/office/infopath/2007/PartnerControls"/>
-    </Event_x0020_VenueTaxHTField0>
-    <TaxCatchAll xmlns="230e9df3-be65-4c73-a93b-d1236ebd677e">
-      <Value>497</Value>
-      <Value>605</Value>
-    </TaxCatchAll>
-    <AudienceTaxHTField0 xmlns="8b529f77-48ab-4581-b468-93f09345b8aa">
-      <Terms xmlns="http://schemas.microsoft.com/office/infopath/2007/PartnerControls"/>
-    </AudienceTaxHTField0>
-  </documentManagement>
-</p:properties>
-</file>
-
-<file path=customXml/item3.xml><?xml version="1.0" encoding="utf-8"?>
-<?mso-contentType ?>
-<FormTemplates xmlns="http://schemas.microsoft.com/sharepoint/v3/contenttype/forms">
-  <Display>DocumentLibraryForm</Display>
-  <Edit>DocumentLibraryForm</Edit>
-  <New>DocumentLibraryForm</New>
-</FormTemplates>
-</file>
-
 <file path=customXml/itemProps1.xml><?xml version="1.0" encoding="utf-8"?>
-<ds:datastoreItem xmlns:ds="http://schemas.openxmlformats.org/officeDocument/2006/customXml" ds:itemID="{0B689815-4B65-4FA2-B74B-E9A4DF6AE7AA}">
+<ds:datastoreItem xmlns:ds="http://schemas.openxmlformats.org/officeDocument/2006/customXml" ds:itemID="{758FDAC0-319D-4A54-8D8E-1D42CB1F8004}">
   <ds:schemaRefs>
-    <ds:schemaRef ds:uri="http://schemas.microsoft.com/office/2006/metadata/contentType"/>
-    <ds:schemaRef ds:uri="http://schemas.microsoft.com/office/2006/metadata/properties/metaAttributes"/>
-    <ds:schemaRef ds:uri="http://www.w3.org/2001/XMLSchema"/>
-    <ds:schemaRef ds:uri="http://schemas.microsoft.com/office/2006/metadata/properties"/>
-    <ds:schemaRef ds:uri="2295e2e7-0eeb-498e-8716-217bb2ee6ee3"/>
-    <ds:schemaRef ds:uri="230e9df3-be65-4c73-a93b-d1236ebd677e"/>
-    <ds:schemaRef ds:uri="8b529f77-48ab-4581-b468-93f09345b8aa"/>
-    <ds:schemaRef ds:uri="http://schemas.microsoft.com/office/2006/documentManagement/types"/>
-    <ds:schemaRef ds:uri="http://schemas.microsoft.com/office/infopath/2007/PartnerControls"/>
-    <ds:schemaRef ds:uri="http://schemas.openxmlformats.org/package/2006/metadata/core-properties"/>
-    <ds:schemaRef ds:uri="http://purl.org/dc/elements/1.1/"/>
-    <ds:schemaRef ds:uri="http://purl.org/dc/terms/"/>
-    <ds:schemaRef ds:uri="http://schemas.microsoft.com/internal/obd"/>
+    <ds:schemaRef ds:uri="http://schemas.microsoft.com/sharepoint/v3/contenttype/forms"/>
   </ds:schemaRefs>
 </ds:datastoreItem>
 </file>
@@ -12614,9 +12622,21 @@
 </file>
 
 <file path=customXml/itemProps3.xml><?xml version="1.0" encoding="utf-8"?>
-<ds:datastoreItem xmlns:ds="http://schemas.openxmlformats.org/officeDocument/2006/customXml" ds:itemID="{758FDAC0-319D-4A54-8D8E-1D42CB1F8004}">
+<ds:datastoreItem xmlns:ds="http://schemas.openxmlformats.org/officeDocument/2006/customXml" ds:itemID="{0B689815-4B65-4FA2-B74B-E9A4DF6AE7AA}">
   <ds:schemaRefs>
-    <ds:schemaRef ds:uri="http://schemas.microsoft.com/sharepoint/v3/contenttype/forms"/>
+    <ds:schemaRef ds:uri="http://schemas.microsoft.com/office/2006/metadata/contentType"/>
+    <ds:schemaRef ds:uri="http://schemas.microsoft.com/office/2006/metadata/properties/metaAttributes"/>
+    <ds:schemaRef ds:uri="http://www.w3.org/2001/XMLSchema"/>
+    <ds:schemaRef ds:uri="http://schemas.microsoft.com/office/2006/metadata/properties"/>
+    <ds:schemaRef ds:uri="2295e2e7-0eeb-498e-8716-217bb2ee6ee3"/>
+    <ds:schemaRef ds:uri="230e9df3-be65-4c73-a93b-d1236ebd677e"/>
+    <ds:schemaRef ds:uri="8b529f77-48ab-4581-b468-93f09345b8aa"/>
+    <ds:schemaRef ds:uri="http://schemas.microsoft.com/office/2006/documentManagement/types"/>
+    <ds:schemaRef ds:uri="http://schemas.microsoft.com/office/infopath/2007/PartnerControls"/>
+    <ds:schemaRef ds:uri="http://schemas.openxmlformats.org/package/2006/metadata/core-properties"/>
+    <ds:schemaRef ds:uri="http://purl.org/dc/elements/1.1/"/>
+    <ds:schemaRef ds:uri="http://purl.org/dc/terms/"/>
+    <ds:schemaRef ds:uri="http://schemas.microsoft.com/internal/obd"/>
   </ds:schemaRefs>
 </ds:datastoreItem>
 </file>
</xml_diff>